<commit_message>
change titles in second slide
</commit_message>
<xml_diff>
--- a/session2/Javascript & jQuery.pptx
+++ b/session2/Javascript & jQuery.pptx
@@ -8399,7 +8399,7 @@
           <a:p>
             <a:pPr/>
             <a:r>
-              <a:t>jquery</a:t>
+              <a:t>using ajax in jquery</a:t>
             </a:r>
           </a:p>
         </p:txBody>
@@ -8498,7 +8498,7 @@
           <a:p>
             <a:pPr/>
             <a:r>
-              <a:t>jquery</a:t>
+              <a:t>using ajax in jquery</a:t>
             </a:r>
           </a:p>
         </p:txBody>
@@ -9379,7 +9379,7 @@
           <a:p>
             <a:pPr/>
             <a:r>
-              <a:t>Javascript</a:t>
+              <a:t>What is Javascript</a:t>
             </a:r>
           </a:p>
         </p:txBody>
@@ -9581,7 +9581,7 @@
           <a:p>
             <a:pPr/>
             <a:r>
-              <a:t>Javascript (continue)</a:t>
+              <a:t>How to use javascript in html</a:t>
             </a:r>
           </a:p>
         </p:txBody>
@@ -9867,7 +9867,7 @@
           <a:p>
             <a:pPr/>
             <a:r>
-              <a:t>Javascript</a:t>
+              <a:t>function of javascript</a:t>
             </a:r>
           </a:p>
         </p:txBody>
@@ -10210,7 +10210,7 @@
           <a:p>
             <a:pPr/>
             <a:r>
-              <a:t>jQuery</a:t>
+              <a:t>what is jQuery</a:t>
             </a:r>
           </a:p>
         </p:txBody>
@@ -10515,7 +10515,7 @@
           <a:p>
             <a:pPr/>
             <a:r>
-              <a:t>jQuery</a:t>
+              <a:t>how to use jQuery in html</a:t>
             </a:r>
           </a:p>
         </p:txBody>
@@ -10593,8 +10593,8 @@
         <p:txBody>
           <a:bodyPr/>
           <a:lstStyle>
-            <a:lvl1pPr defTabSz="832103">
-              <a:defRPr sz="1800">
+            <a:lvl1pPr defTabSz="267886">
+              <a:defRPr cap="all" sz="1800">
                 <a:latin typeface="Impact"/>
                 <a:ea typeface="Impact"/>
                 <a:cs typeface="Impact"/>
@@ -10605,7 +10605,7 @@
           <a:p>
             <a:pPr/>
             <a:r>
-              <a:t>JQUERY</a:t>
+              <a:t>how to use selector in JQUERY</a:t>
             </a:r>
           </a:p>
         </p:txBody>
@@ -10948,7 +10948,7 @@
           <a:p>
             <a:pPr/>
             <a:r>
-              <a:t>jquery</a:t>
+              <a:t>use jquery to operate html element</a:t>
             </a:r>
           </a:p>
         </p:txBody>

</xml_diff>